<commit_message>
Changed Collaboration Diagram on Slide.
</commit_message>
<xml_diff>
--- a/docs/Slides/Team 1 - SRS Presentation - MUMLife.pptx
+++ b/docs/Slides/Team 1 - SRS Presentation - MUMLife.pptx
@@ -128,7 +128,7 @@
 <file path=ppt/revisionInfo.xml><?xml version="1.0" encoding="utf-8"?>
 <p1510:revInfo xmlns:a="http://schemas.openxmlformats.org/drawingml/2006/main" xmlns:r="http://schemas.openxmlformats.org/officeDocument/2006/relationships" xmlns:p1510="http://schemas.microsoft.com/office/powerpoint/2015/10/main">
   <p1510:revLst>
-    <p1510:client id="{DC88A6F1-00A5-44C0-BBB3-FEE3F6555C25}" v="6" dt="2019-10-05T02:54:48.880"/>
+    <p1510:client id="{DC88A6F1-00A5-44C0-BBB3-FEE3F6555C25}" v="7" dt="2019-10-05T02:59:10.851"/>
   </p1510:revLst>
 </p1510:revInfo>
 </file>
@@ -138,7 +138,7 @@
   <pc:docChgLst>
     <pc:chgData name="Jonathan Getachew" userId="59136f738c513e52" providerId="LiveId" clId="{DC88A6F1-00A5-44C0-BBB3-FEE3F6555C25}"/>
     <pc:docChg chg="undo redo custSel addSld modSld">
-      <pc:chgData name="Jonathan Getachew" userId="59136f738c513e52" providerId="LiveId" clId="{DC88A6F1-00A5-44C0-BBB3-FEE3F6555C25}" dt="2019-10-05T02:54:48.880" v="79"/>
+      <pc:chgData name="Jonathan Getachew" userId="59136f738c513e52" providerId="LiveId" clId="{DC88A6F1-00A5-44C0-BBB3-FEE3F6555C25}" dt="2019-10-05T02:59:10.850" v="80" actId="14826"/>
       <pc:docMkLst>
         <pc:docMk/>
       </pc:docMkLst>
@@ -188,7 +188,7 @@
         </pc:spChg>
       </pc:sldChg>
       <pc:sldChg chg="addSp delSp modSp add modTransition">
-        <pc:chgData name="Jonathan Getachew" userId="59136f738c513e52" providerId="LiveId" clId="{DC88A6F1-00A5-44C0-BBB3-FEE3F6555C25}" dt="2019-10-05T02:54:48.880" v="79"/>
+        <pc:chgData name="Jonathan Getachew" userId="59136f738c513e52" providerId="LiveId" clId="{DC88A6F1-00A5-44C0-BBB3-FEE3F6555C25}" dt="2019-10-05T02:59:10.850" v="80" actId="14826"/>
         <pc:sldMkLst>
           <pc:docMk/>
           <pc:sldMk cId="1039725118" sldId="266"/>
@@ -218,7 +218,7 @@
           </ac:spMkLst>
         </pc:spChg>
         <pc:picChg chg="add mod">
-          <ac:chgData name="Jonathan Getachew" userId="59136f738c513e52" providerId="LiveId" clId="{DC88A6F1-00A5-44C0-BBB3-FEE3F6555C25}" dt="2019-10-05T02:52:53.101" v="50" actId="1076"/>
+          <ac:chgData name="Jonathan Getachew" userId="59136f738c513e52" providerId="LiveId" clId="{DC88A6F1-00A5-44C0-BBB3-FEE3F6555C25}" dt="2019-10-05T02:59:10.850" v="80" actId="14826"/>
           <ac:picMkLst>
             <pc:docMk/>
             <pc:sldMk cId="1039725118" sldId="266"/>
@@ -6968,7 +6968,7 @@
         <p:spPr>
           <a:xfrm>
             <a:off x="2007207" y="649119"/>
-            <a:ext cx="8177586" cy="5559761"/>
+            <a:ext cx="8177585" cy="5559761"/>
           </a:xfrm>
         </p:spPr>
       </p:pic>

</xml_diff>